<commit_message>
Added logo and team name to slides
</commit_message>
<xml_diff>
--- a/Interim Presentation/Software Engineering.pptx
+++ b/Interim Presentation/Software Engineering.pptx
@@ -225,7 +225,7 @@
           <a:p>
             <a:fld id="{D499C1BB-0018-4F91-BF83-7408753661FD}" type="datetimeFigureOut">
               <a:rPr lang="en-US" smtClean="0"/>
-              <a:t>2/26/2017</a:t>
+              <a:t>2/27/2017</a:t>
             </a:fld>
             <a:endParaRPr lang="en-US"/>
           </a:p>
@@ -576,7 +576,7 @@
             <a:fld id="{81331B57-0BE5-4F82-AA58-76F53EFF3ADA}" type="datetime8">
               <a:rPr lang="en-US" smtClean="0"/>
               <a:pPr/>
-              <a:t>2/26/2017 5:37 PM</a:t>
+              <a:t>2/27/2017 4:24 PM</a:t>
             </a:fld>
             <a:endParaRPr lang="en-US" dirty="0"/>
           </a:p>
@@ -765,7 +765,7 @@
             <a:fld id="{81331B57-0BE5-4F82-AA58-76F53EFF3ADA}" type="datetime8">
               <a:rPr lang="en-US" smtClean="0"/>
               <a:pPr/>
-              <a:t>2/26/2017 5:37 PM</a:t>
+              <a:t>2/27/2017 4:24 PM</a:t>
             </a:fld>
             <a:endParaRPr lang="en-US"/>
           </a:p>
@@ -949,7 +949,7 @@
             <a:fld id="{81331B57-0BE5-4F82-AA58-76F53EFF3ADA}" type="datetime8">
               <a:rPr lang="en-US" smtClean="0"/>
               <a:pPr/>
-              <a:t>2/26/2017 5:37 PM</a:t>
+              <a:t>2/27/2017 4:24 PM</a:t>
             </a:fld>
             <a:endParaRPr lang="en-US"/>
           </a:p>
@@ -1133,7 +1133,7 @@
             <a:fld id="{81331B57-0BE5-4F82-AA58-76F53EFF3ADA}" type="datetime8">
               <a:rPr lang="en-US" smtClean="0"/>
               <a:pPr/>
-              <a:t>2/26/2017 5:37 PM</a:t>
+              <a:t>2/27/2017 4:24 PM</a:t>
             </a:fld>
             <a:endParaRPr lang="en-US"/>
           </a:p>
@@ -1317,7 +1317,7 @@
             <a:fld id="{81331B57-0BE5-4F82-AA58-76F53EFF3ADA}" type="datetime8">
               <a:rPr lang="en-US" smtClean="0"/>
               <a:pPr/>
-              <a:t>2/26/2017 5:37 PM</a:t>
+              <a:t>2/27/2017 4:24 PM</a:t>
             </a:fld>
             <a:endParaRPr lang="en-US"/>
           </a:p>
@@ -1501,7 +1501,7 @@
             <a:fld id="{81331B57-0BE5-4F82-AA58-76F53EFF3ADA}" type="datetime8">
               <a:rPr lang="en-US" smtClean="0"/>
               <a:pPr/>
-              <a:t>2/26/2017 5:37 PM</a:t>
+              <a:t>2/27/2017 4:24 PM</a:t>
             </a:fld>
             <a:endParaRPr lang="en-US"/>
           </a:p>
@@ -1685,7 +1685,7 @@
             <a:fld id="{81331B57-0BE5-4F82-AA58-76F53EFF3ADA}" type="datetime8">
               <a:rPr lang="en-US" smtClean="0"/>
               <a:pPr/>
-              <a:t>2/26/2017 5:37 PM</a:t>
+              <a:t>2/27/2017 4:24 PM</a:t>
             </a:fld>
             <a:endParaRPr lang="en-US"/>
           </a:p>
@@ -1869,7 +1869,7 @@
             <a:fld id="{81331B57-0BE5-4F82-AA58-76F53EFF3ADA}" type="datetime8">
               <a:rPr lang="en-US" smtClean="0"/>
               <a:pPr/>
-              <a:t>2/26/2017 5:37 PM</a:t>
+              <a:t>2/27/2017 4:24 PM</a:t>
             </a:fld>
             <a:endParaRPr lang="en-US"/>
           </a:p>
@@ -2053,7 +2053,7 @@
             <a:fld id="{81331B57-0BE5-4F82-AA58-76F53EFF3ADA}" type="datetime8">
               <a:rPr lang="en-US" smtClean="0"/>
               <a:pPr/>
-              <a:t>2/26/2017 5:37 PM</a:t>
+              <a:t>2/27/2017 4:24 PM</a:t>
             </a:fld>
             <a:endParaRPr lang="en-US"/>
           </a:p>
@@ -2237,7 +2237,7 @@
             <a:fld id="{81331B57-0BE5-4F82-AA58-76F53EFF3ADA}" type="datetime8">
               <a:rPr lang="en-US" smtClean="0"/>
               <a:pPr/>
-              <a:t>2/26/2017 5:37 PM</a:t>
+              <a:t>2/27/2017 4:24 PM</a:t>
             </a:fld>
             <a:endParaRPr lang="en-US" dirty="0"/>
           </a:p>
@@ -2431,7 +2431,7 @@
             <a:fld id="{81331B57-0BE5-4F82-AA58-76F53EFF3ADA}" type="datetime8">
               <a:rPr lang="en-US" smtClean="0"/>
               <a:pPr/>
-              <a:t>2/26/2017 5:37 PM</a:t>
+              <a:t>2/27/2017 4:24 PM</a:t>
             </a:fld>
             <a:endParaRPr lang="en-US"/>
           </a:p>
@@ -2610,7 +2610,7 @@
             <a:fld id="{81331B57-0BE5-4F82-AA58-76F53EFF3ADA}" type="datetime8">
               <a:rPr lang="en-US" smtClean="0"/>
               <a:pPr/>
-              <a:t>2/26/2017 5:37 PM</a:t>
+              <a:t>2/27/2017 4:24 PM</a:t>
             </a:fld>
             <a:endParaRPr lang="en-US"/>
           </a:p>
@@ -2789,7 +2789,7 @@
             <a:fld id="{81331B57-0BE5-4F82-AA58-76F53EFF3ADA}" type="datetime8">
               <a:rPr lang="en-US" smtClean="0"/>
               <a:pPr/>
-              <a:t>2/26/2017 5:37 PM</a:t>
+              <a:t>2/27/2017 4:24 PM</a:t>
             </a:fld>
             <a:endParaRPr lang="en-US"/>
           </a:p>
@@ -2973,7 +2973,7 @@
             <a:fld id="{81331B57-0BE5-4F82-AA58-76F53EFF3ADA}" type="datetime8">
               <a:rPr lang="en-US" smtClean="0"/>
               <a:pPr/>
-              <a:t>2/26/2017 5:37 PM</a:t>
+              <a:t>2/27/2017 4:24 PM</a:t>
             </a:fld>
             <a:endParaRPr lang="en-US"/>
           </a:p>
@@ -3157,7 +3157,7 @@
             <a:fld id="{81331B57-0BE5-4F82-AA58-76F53EFF3ADA}" type="datetime8">
               <a:rPr lang="en-US" smtClean="0"/>
               <a:pPr/>
-              <a:t>2/26/2017 5:37 PM</a:t>
+              <a:t>2/27/2017 4:24 PM</a:t>
             </a:fld>
             <a:endParaRPr lang="en-US"/>
           </a:p>
@@ -3341,7 +3341,7 @@
             <a:fld id="{81331B57-0BE5-4F82-AA58-76F53EFF3ADA}" type="datetime8">
               <a:rPr lang="en-US" smtClean="0"/>
               <a:pPr/>
-              <a:t>2/26/2017 5:37 PM</a:t>
+              <a:t>2/27/2017 4:24 PM</a:t>
             </a:fld>
             <a:endParaRPr lang="en-US"/>
           </a:p>
@@ -3525,7 +3525,7 @@
             <a:fld id="{81331B57-0BE5-4F82-AA58-76F53EFF3ADA}" type="datetime8">
               <a:rPr lang="en-US" smtClean="0"/>
               <a:pPr/>
-              <a:t>2/26/2017 5:37 PM</a:t>
+              <a:t>2/27/2017 4:24 PM</a:t>
             </a:fld>
             <a:endParaRPr lang="en-US"/>
           </a:p>
@@ -8101,36 +8101,6 @@
       </p:grpSpPr>
       <p:sp>
         <p:nvSpPr>
-          <p:cNvPr id="2" name="Title 1"/>
-          <p:cNvSpPr>
-            <a:spLocks noGrp="1"/>
-          </p:cNvSpPr>
-          <p:nvPr>
-            <p:ph type="ctrTitle"/>
-          </p:nvPr>
-        </p:nvSpPr>
-        <p:spPr>
-          <a:xfrm>
-            <a:off x="730249" y="457200"/>
-            <a:ext cx="7681913" cy="1523495"/>
-          </a:xfrm>
-        </p:spPr>
-        <p:txBody>
-          <a:bodyPr/>
-          <a:lstStyle/>
-          <a:p>
-            <a:pPr algn="ctr"/>
-            <a:r>
-              <a:rPr lang="en-US" dirty="0">
-                <a:latin typeface="Georgia" panose="02040502050405020303" pitchFamily="18" charset="0"/>
-              </a:rPr>
-              <a:t>*Team Name and Logo Here</a:t>
-            </a:r>
-          </a:p>
-        </p:txBody>
-      </p:sp>
-      <p:sp>
-        <p:nvSpPr>
           <p:cNvPr id="3" name="Rectangle 2"/>
           <p:cNvSpPr/>
           <p:nvPr/>
@@ -8236,6 +8206,36 @@
           </a:p>
         </p:txBody>
       </p:sp>
+      <p:pic>
+        <p:nvPicPr>
+          <p:cNvPr id="6" name="Picture 5"/>
+          <p:cNvPicPr>
+            <a:picLocks noChangeAspect="1"/>
+          </p:cNvPicPr>
+          <p:nvPr/>
+        </p:nvPicPr>
+        <p:blipFill>
+          <a:blip r:embed="rId3" cstate="print">
+            <a:extLst>
+              <a:ext uri="{28A0092B-C50C-407E-A947-70E740481C1C}">
+                <a14:useLocalDpi xmlns:a14="http://schemas.microsoft.com/office/drawing/2010/main" val="0"/>
+              </a:ext>
+            </a:extLst>
+          </a:blip>
+          <a:stretch>
+            <a:fillRect/>
+          </a:stretch>
+        </p:blipFill>
+        <p:spPr>
+          <a:xfrm>
+            <a:off x="753136" y="-457200"/>
+            <a:ext cx="7636138" cy="4295328"/>
+          </a:xfrm>
+          <a:prstGeom prst="rect">
+            <a:avLst/>
+          </a:prstGeom>
+        </p:spPr>
+      </p:pic>
     </p:spTree>
     <p:extLst>
       <p:ext uri="{BB962C8B-B14F-4D97-AF65-F5344CB8AC3E}">

</xml_diff>

<commit_message>
Uploading the final presentation
</commit_message>
<xml_diff>
--- a/Interim Presentation/Software Engineering.pptx
+++ b/Interim Presentation/Software Engineering.pptx
@@ -225,7 +225,7 @@
           <a:p>
             <a:fld id="{D499C1BB-0018-4F91-BF83-7408753661FD}" type="datetimeFigureOut">
               <a:rPr lang="en-US" smtClean="0"/>
-              <a:t>2/27/2017</a:t>
+              <a:t>3/2/2017</a:t>
             </a:fld>
             <a:endParaRPr lang="en-US"/>
           </a:p>
@@ -576,7 +576,7 @@
             <a:fld id="{81331B57-0BE5-4F82-AA58-76F53EFF3ADA}" type="datetime8">
               <a:rPr lang="en-US" smtClean="0"/>
               <a:pPr/>
-              <a:t>2/27/2017 4:24 PM</a:t>
+              <a:t>3/2/2017 8:19 AM</a:t>
             </a:fld>
             <a:endParaRPr lang="en-US" dirty="0"/>
           </a:p>
@@ -765,7 +765,7 @@
             <a:fld id="{81331B57-0BE5-4F82-AA58-76F53EFF3ADA}" type="datetime8">
               <a:rPr lang="en-US" smtClean="0"/>
               <a:pPr/>
-              <a:t>2/27/2017 4:24 PM</a:t>
+              <a:t>3/2/2017 8:19 AM</a:t>
             </a:fld>
             <a:endParaRPr lang="en-US"/>
           </a:p>
@@ -949,7 +949,7 @@
             <a:fld id="{81331B57-0BE5-4F82-AA58-76F53EFF3ADA}" type="datetime8">
               <a:rPr lang="en-US" smtClean="0"/>
               <a:pPr/>
-              <a:t>2/27/2017 4:24 PM</a:t>
+              <a:t>3/2/2017 8:19 AM</a:t>
             </a:fld>
             <a:endParaRPr lang="en-US"/>
           </a:p>
@@ -1133,7 +1133,7 @@
             <a:fld id="{81331B57-0BE5-4F82-AA58-76F53EFF3ADA}" type="datetime8">
               <a:rPr lang="en-US" smtClean="0"/>
               <a:pPr/>
-              <a:t>2/27/2017 4:24 PM</a:t>
+              <a:t>3/2/2017 8:19 AM</a:t>
             </a:fld>
             <a:endParaRPr lang="en-US"/>
           </a:p>
@@ -1317,7 +1317,7 @@
             <a:fld id="{81331B57-0BE5-4F82-AA58-76F53EFF3ADA}" type="datetime8">
               <a:rPr lang="en-US" smtClean="0"/>
               <a:pPr/>
-              <a:t>2/27/2017 4:24 PM</a:t>
+              <a:t>3/2/2017 8:19 AM</a:t>
             </a:fld>
             <a:endParaRPr lang="en-US"/>
           </a:p>
@@ -1501,7 +1501,7 @@
             <a:fld id="{81331B57-0BE5-4F82-AA58-76F53EFF3ADA}" type="datetime8">
               <a:rPr lang="en-US" smtClean="0"/>
               <a:pPr/>
-              <a:t>2/27/2017 4:24 PM</a:t>
+              <a:t>3/2/2017 8:19 AM</a:t>
             </a:fld>
             <a:endParaRPr lang="en-US"/>
           </a:p>
@@ -1685,7 +1685,7 @@
             <a:fld id="{81331B57-0BE5-4F82-AA58-76F53EFF3ADA}" type="datetime8">
               <a:rPr lang="en-US" smtClean="0"/>
               <a:pPr/>
-              <a:t>2/27/2017 4:24 PM</a:t>
+              <a:t>3/2/2017 8:19 AM</a:t>
             </a:fld>
             <a:endParaRPr lang="en-US"/>
           </a:p>
@@ -1869,7 +1869,7 @@
             <a:fld id="{81331B57-0BE5-4F82-AA58-76F53EFF3ADA}" type="datetime8">
               <a:rPr lang="en-US" smtClean="0"/>
               <a:pPr/>
-              <a:t>2/27/2017 4:24 PM</a:t>
+              <a:t>3/2/2017 8:19 AM</a:t>
             </a:fld>
             <a:endParaRPr lang="en-US"/>
           </a:p>
@@ -2053,7 +2053,7 @@
             <a:fld id="{81331B57-0BE5-4F82-AA58-76F53EFF3ADA}" type="datetime8">
               <a:rPr lang="en-US" smtClean="0"/>
               <a:pPr/>
-              <a:t>2/27/2017 4:24 PM</a:t>
+              <a:t>3/2/2017 8:19 AM</a:t>
             </a:fld>
             <a:endParaRPr lang="en-US"/>
           </a:p>
@@ -2237,7 +2237,7 @@
             <a:fld id="{81331B57-0BE5-4F82-AA58-76F53EFF3ADA}" type="datetime8">
               <a:rPr lang="en-US" smtClean="0"/>
               <a:pPr/>
-              <a:t>2/27/2017 4:24 PM</a:t>
+              <a:t>3/2/2017 8:19 AM</a:t>
             </a:fld>
             <a:endParaRPr lang="en-US" dirty="0"/>
           </a:p>
@@ -2431,7 +2431,7 @@
             <a:fld id="{81331B57-0BE5-4F82-AA58-76F53EFF3ADA}" type="datetime8">
               <a:rPr lang="en-US" smtClean="0"/>
               <a:pPr/>
-              <a:t>2/27/2017 4:24 PM</a:t>
+              <a:t>3/2/2017 8:19 AM</a:t>
             </a:fld>
             <a:endParaRPr lang="en-US"/>
           </a:p>
@@ -2610,7 +2610,7 @@
             <a:fld id="{81331B57-0BE5-4F82-AA58-76F53EFF3ADA}" type="datetime8">
               <a:rPr lang="en-US" smtClean="0"/>
               <a:pPr/>
-              <a:t>2/27/2017 4:24 PM</a:t>
+              <a:t>3/2/2017 8:19 AM</a:t>
             </a:fld>
             <a:endParaRPr lang="en-US"/>
           </a:p>
@@ -2789,7 +2789,7 @@
             <a:fld id="{81331B57-0BE5-4F82-AA58-76F53EFF3ADA}" type="datetime8">
               <a:rPr lang="en-US" smtClean="0"/>
               <a:pPr/>
-              <a:t>2/27/2017 4:24 PM</a:t>
+              <a:t>3/2/2017 8:19 AM</a:t>
             </a:fld>
             <a:endParaRPr lang="en-US"/>
           </a:p>
@@ -2973,7 +2973,7 @@
             <a:fld id="{81331B57-0BE5-4F82-AA58-76F53EFF3ADA}" type="datetime8">
               <a:rPr lang="en-US" smtClean="0"/>
               <a:pPr/>
-              <a:t>2/27/2017 4:24 PM</a:t>
+              <a:t>3/2/2017 8:19 AM</a:t>
             </a:fld>
             <a:endParaRPr lang="en-US"/>
           </a:p>
@@ -3157,7 +3157,7 @@
             <a:fld id="{81331B57-0BE5-4F82-AA58-76F53EFF3ADA}" type="datetime8">
               <a:rPr lang="en-US" smtClean="0"/>
               <a:pPr/>
-              <a:t>2/27/2017 4:24 PM</a:t>
+              <a:t>3/2/2017 8:19 AM</a:t>
             </a:fld>
             <a:endParaRPr lang="en-US"/>
           </a:p>
@@ -3341,7 +3341,7 @@
             <a:fld id="{81331B57-0BE5-4F82-AA58-76F53EFF3ADA}" type="datetime8">
               <a:rPr lang="en-US" smtClean="0"/>
               <a:pPr/>
-              <a:t>2/27/2017 4:24 PM</a:t>
+              <a:t>3/2/2017 8:19 AM</a:t>
             </a:fld>
             <a:endParaRPr lang="en-US"/>
           </a:p>
@@ -3525,7 +3525,7 @@
             <a:fld id="{81331B57-0BE5-4F82-AA58-76F53EFF3ADA}" type="datetime8">
               <a:rPr lang="en-US" smtClean="0"/>
               <a:pPr/>
-              <a:t>2/27/2017 4:24 PM</a:t>
+              <a:t>3/2/2017 8:19 AM</a:t>
             </a:fld>
             <a:endParaRPr lang="en-US"/>
           </a:p>

</xml_diff>